<commit_message>
Deployed 4c6175e with MkDocs version: 1.6.0
</commit_message>
<xml_diff>
--- a/aulas/16-revisao4/aula16_revisao4.pptx
+++ b/aulas/16-revisao4/aula16_revisao4.pptx
@@ -299,7 +299,7 @@
 <file path=ppt/revisionInfo.xml><?xml version="1.0" encoding="utf-8"?>
 <p1510:revInfo xmlns:a="http://schemas.openxmlformats.org/drawingml/2006/main" xmlns:r="http://schemas.openxmlformats.org/officeDocument/2006/relationships" xmlns:p1510="http://schemas.microsoft.com/office/powerpoint/2015/10/main">
   <p1510:revLst>
-    <p1510:client id="{584C6F57-B53D-42C4-A1D6-33584154ECF3}" v="8" dt="2024-10-21T17:09:23.843"/>
+    <p1510:client id="{584C6F57-B53D-42C4-A1D6-33584154ECF3}" v="18" dt="2024-10-23T22:14:33.191"/>
   </p1510:revLst>
 </p1510:revInfo>
 </file>
@@ -341,12 +341,12 @@
   <pc:docChgLst>
     <pc:chgData name="Luciano Pereira Soares" userId="16c53e34-c952-423e-8700-c0525d23304f" providerId="ADAL" clId="{584C6F57-B53D-42C4-A1D6-33584154ECF3}"/>
     <pc:docChg chg="undo custSel modSld">
-      <pc:chgData name="Luciano Pereira Soares" userId="16c53e34-c952-423e-8700-c0525d23304f" providerId="ADAL" clId="{584C6F57-B53D-42C4-A1D6-33584154ECF3}" dt="2024-10-21T17:09:32.119" v="144" actId="14100"/>
+      <pc:chgData name="Luciano Pereira Soares" userId="16c53e34-c952-423e-8700-c0525d23304f" providerId="ADAL" clId="{584C6F57-B53D-42C4-A1D6-33584154ECF3}" dt="2024-10-23T22:14:33.190" v="164" actId="1076"/>
       <pc:docMkLst>
         <pc:docMk/>
       </pc:docMkLst>
       <pc:sldChg chg="addSp delSp modSp mod">
-        <pc:chgData name="Luciano Pereira Soares" userId="16c53e34-c952-423e-8700-c0525d23304f" providerId="ADAL" clId="{584C6F57-B53D-42C4-A1D6-33584154ECF3}" dt="2024-10-21T17:09:32.119" v="144" actId="14100"/>
+        <pc:chgData name="Luciano Pereira Soares" userId="16c53e34-c952-423e-8700-c0525d23304f" providerId="ADAL" clId="{584C6F57-B53D-42C4-A1D6-33584154ECF3}" dt="2024-10-23T22:14:33.190" v="164" actId="1076"/>
         <pc:sldMkLst>
           <pc:docMk/>
           <pc:sldMk cId="2257687813" sldId="349"/>
@@ -384,13 +384,29 @@
           </ac:spMkLst>
         </pc:spChg>
         <pc:grpChg chg="add mod">
-          <ac:chgData name="Luciano Pereira Soares" userId="16c53e34-c952-423e-8700-c0525d23304f" providerId="ADAL" clId="{584C6F57-B53D-42C4-A1D6-33584154ECF3}" dt="2024-10-21T17:09:32.119" v="144" actId="14100"/>
+          <ac:chgData name="Luciano Pereira Soares" userId="16c53e34-c952-423e-8700-c0525d23304f" providerId="ADAL" clId="{584C6F57-B53D-42C4-A1D6-33584154ECF3}" dt="2024-10-23T22:14:26.630" v="159" actId="1076"/>
           <ac:grpSpMkLst>
             <pc:docMk/>
             <pc:sldMk cId="2257687813" sldId="349"/>
             <ac:grpSpMk id="10" creationId="{AC607F92-1463-C597-10D7-853239C48EC8}"/>
           </ac:grpSpMkLst>
         </pc:grpChg>
+        <pc:picChg chg="add mod modCrop">
+          <ac:chgData name="Luciano Pereira Soares" userId="16c53e34-c952-423e-8700-c0525d23304f" providerId="ADAL" clId="{584C6F57-B53D-42C4-A1D6-33584154ECF3}" dt="2024-10-23T22:14:28.927" v="161" actId="1076"/>
+          <ac:picMkLst>
+            <pc:docMk/>
+            <pc:sldMk cId="2257687813" sldId="349"/>
+            <ac:picMk id="5" creationId="{7E25A13C-64B9-B22C-77E6-7C711D47D903}"/>
+          </ac:picMkLst>
+        </pc:picChg>
+        <pc:picChg chg="add mod">
+          <ac:chgData name="Luciano Pereira Soares" userId="16c53e34-c952-423e-8700-c0525d23304f" providerId="ADAL" clId="{584C6F57-B53D-42C4-A1D6-33584154ECF3}" dt="2024-10-23T22:14:33.190" v="164" actId="1076"/>
+          <ac:picMkLst>
+            <pc:docMk/>
+            <pc:sldMk cId="2257687813" sldId="349"/>
+            <ac:picMk id="6" creationId="{32F87A5D-E5E6-635B-37D8-D14A4D20E490}"/>
+          </ac:picMkLst>
+        </pc:picChg>
         <pc:picChg chg="add del mod modCrop">
           <ac:chgData name="Luciano Pereira Soares" userId="16c53e34-c952-423e-8700-c0525d23304f" providerId="ADAL" clId="{584C6F57-B53D-42C4-A1D6-33584154ECF3}" dt="2024-10-21T17:08:16.042" v="86" actId="478"/>
           <ac:picMkLst>
@@ -24196,7 +24212,7 @@
         </p:nvGrpSpPr>
         <p:grpSpPr>
           <a:xfrm>
-            <a:off x="3545518" y="3667101"/>
+            <a:off x="6479218" y="3395864"/>
             <a:ext cx="1935487" cy="1589393"/>
             <a:chOff x="3545518" y="3667101"/>
             <a:chExt cx="1935487" cy="1589393"/>
@@ -24363,6 +24379,80 @@
           </p:txBody>
         </p:sp>
       </p:grpSp>
+      <p:pic>
+        <p:nvPicPr>
+          <p:cNvPr id="5" name="Picture 4" descr="A colorful circle with black background&#10;&#10;Description automatically generated">
+            <a:extLst>
+              <a:ext uri="{FF2B5EF4-FFF2-40B4-BE49-F238E27FC236}">
+                <a16:creationId xmlns:a16="http://schemas.microsoft.com/office/drawing/2014/main" id="{7E25A13C-64B9-B22C-77E6-7C711D47D903}"/>
+              </a:ext>
+            </a:extLst>
+          </p:cNvPr>
+          <p:cNvPicPr>
+            <a:picLocks noChangeAspect="1"/>
+          </p:cNvPicPr>
+          <p:nvPr/>
+        </p:nvPicPr>
+        <p:blipFill>
+          <a:blip r:embed="rId3"/>
+          <a:srcRect l="20584" t="21781" r="20584" b="21781"/>
+          <a:stretch/>
+        </p:blipFill>
+        <p:spPr>
+          <a:xfrm>
+            <a:off x="4432319" y="3427257"/>
+            <a:ext cx="1746916" cy="1752506"/>
+          </a:xfrm>
+          <a:prstGeom prst="rect">
+            <a:avLst/>
+          </a:prstGeom>
+        </p:spPr>
+      </p:pic>
+      <p:pic>
+        <p:nvPicPr>
+          <p:cNvPr id="6" name="Picture 2" descr="geom-split-vertices - npm">
+            <a:extLst>
+              <a:ext uri="{FF2B5EF4-FFF2-40B4-BE49-F238E27FC236}">
+                <a16:creationId xmlns:a16="http://schemas.microsoft.com/office/drawing/2014/main" id="{32F87A5D-E5E6-635B-37D8-D14A4D20E490}"/>
+              </a:ext>
+            </a:extLst>
+          </p:cNvPr>
+          <p:cNvPicPr>
+            <a:picLocks noChangeAspect="1" noChangeArrowheads="1"/>
+          </p:cNvPicPr>
+          <p:nvPr/>
+        </p:nvPicPr>
+        <p:blipFill rotWithShape="1">
+          <a:blip r:embed="rId4">
+            <a:extLst>
+              <a:ext uri="{28A0092B-C50C-407E-A947-70E740481C1C}">
+                <a14:useLocalDpi xmlns:a14="http://schemas.microsoft.com/office/drawing/2010/main" val="0"/>
+              </a:ext>
+            </a:extLst>
+          </a:blip>
+          <a:srcRect l="8531" t="15988" r="8531" b="15988"/>
+          <a:stretch/>
+        </p:blipFill>
+        <p:spPr bwMode="auto">
+          <a:xfrm>
+            <a:off x="429532" y="3527362"/>
+            <a:ext cx="3844941" cy="1773878"/>
+          </a:xfrm>
+          <a:prstGeom prst="rect">
+            <a:avLst/>
+          </a:prstGeom>
+          <a:noFill/>
+          <a:extLst>
+            <a:ext uri="{909E8E84-426E-40DD-AFC4-6F175D3DCCD1}">
+              <a14:hiddenFill xmlns:a14="http://schemas.microsoft.com/office/drawing/2010/main">
+                <a:solidFill>
+                  <a:srgbClr val="FFFFFF"/>
+                </a:solidFill>
+              </a14:hiddenFill>
+            </a:ext>
+          </a:extLst>
+        </p:spPr>
+      </p:pic>
     </p:spTree>
     <p:extLst>
       <p:ext uri="{BB962C8B-B14F-4D97-AF65-F5344CB8AC3E}">

</xml_diff>